<commit_message>
Update DG class diagram
Architecture and LogicComponent diagrams update; image and powerpoint.
</commit_message>
<xml_diff>
--- a/docs/diagrams/ArchitectureDiagram.pptx
+++ b/docs/diagrams/ArchitectureDiagram.pptx
@@ -208,7 +208,7 @@
           <a:p>
             <a:fld id="{F5CC4B3F-88C1-4FFA-B1B6-F41C21DC6924}" type="datetimeFigureOut">
               <a:rPr lang="en-US" smtClean="0"/>
-              <a:t>12/15/2018</a:t>
+              <a:t>3/31/2019</a:t>
             </a:fld>
             <a:endParaRPr lang="en-US"/>
           </a:p>
@@ -654,7 +654,7 @@
           <a:p>
             <a:fld id="{78C97017-6FC3-485B-9764-EAC9E56C1D49}" type="datetimeFigureOut">
               <a:rPr lang="en-US" smtClean="0"/>
-              <a:t>12/15/2018</a:t>
+              <a:t>3/31/2019</a:t>
             </a:fld>
             <a:endParaRPr lang="en-US"/>
           </a:p>
@@ -822,7 +822,7 @@
           <a:p>
             <a:fld id="{78C97017-6FC3-485B-9764-EAC9E56C1D49}" type="datetimeFigureOut">
               <a:rPr lang="en-US" smtClean="0"/>
-              <a:t>12/15/2018</a:t>
+              <a:t>3/31/2019</a:t>
             </a:fld>
             <a:endParaRPr lang="en-US"/>
           </a:p>
@@ -1000,7 +1000,7 @@
           <a:p>
             <a:fld id="{78C97017-6FC3-485B-9764-EAC9E56C1D49}" type="datetimeFigureOut">
               <a:rPr lang="en-US" smtClean="0"/>
-              <a:t>12/15/2018</a:t>
+              <a:t>3/31/2019</a:t>
             </a:fld>
             <a:endParaRPr lang="en-US"/>
           </a:p>
@@ -1168,7 +1168,7 @@
           <a:p>
             <a:fld id="{78C97017-6FC3-485B-9764-EAC9E56C1D49}" type="datetimeFigureOut">
               <a:rPr lang="en-US" smtClean="0"/>
-              <a:t>12/15/2018</a:t>
+              <a:t>3/31/2019</a:t>
             </a:fld>
             <a:endParaRPr lang="en-US"/>
           </a:p>
@@ -1413,7 +1413,7 @@
           <a:p>
             <a:fld id="{78C97017-6FC3-485B-9764-EAC9E56C1D49}" type="datetimeFigureOut">
               <a:rPr lang="en-US" smtClean="0"/>
-              <a:t>12/15/2018</a:t>
+              <a:t>3/31/2019</a:t>
             </a:fld>
             <a:endParaRPr lang="en-US"/>
           </a:p>
@@ -1698,7 +1698,7 @@
           <a:p>
             <a:fld id="{78C97017-6FC3-485B-9764-EAC9E56C1D49}" type="datetimeFigureOut">
               <a:rPr lang="en-US" smtClean="0"/>
-              <a:t>12/15/2018</a:t>
+              <a:t>3/31/2019</a:t>
             </a:fld>
             <a:endParaRPr lang="en-US"/>
           </a:p>
@@ -2117,7 +2117,7 @@
           <a:p>
             <a:fld id="{78C97017-6FC3-485B-9764-EAC9E56C1D49}" type="datetimeFigureOut">
               <a:rPr lang="en-US" smtClean="0"/>
-              <a:t>12/15/2018</a:t>
+              <a:t>3/31/2019</a:t>
             </a:fld>
             <a:endParaRPr lang="en-US"/>
           </a:p>
@@ -2234,7 +2234,7 @@
           <a:p>
             <a:fld id="{78C97017-6FC3-485B-9764-EAC9E56C1D49}" type="datetimeFigureOut">
               <a:rPr lang="en-US" smtClean="0"/>
-              <a:t>12/15/2018</a:t>
+              <a:t>3/31/2019</a:t>
             </a:fld>
             <a:endParaRPr lang="en-US"/>
           </a:p>
@@ -2329,7 +2329,7 @@
           <a:p>
             <a:fld id="{78C97017-6FC3-485B-9764-EAC9E56C1D49}" type="datetimeFigureOut">
               <a:rPr lang="en-US" smtClean="0"/>
-              <a:t>12/15/2018</a:t>
+              <a:t>3/31/2019</a:t>
             </a:fld>
             <a:endParaRPr lang="en-US"/>
           </a:p>
@@ -2604,7 +2604,7 @@
           <a:p>
             <a:fld id="{78C97017-6FC3-485B-9764-EAC9E56C1D49}" type="datetimeFigureOut">
               <a:rPr lang="en-US" smtClean="0"/>
-              <a:t>12/15/2018</a:t>
+              <a:t>3/31/2019</a:t>
             </a:fld>
             <a:endParaRPr lang="en-US"/>
           </a:p>
@@ -2856,7 +2856,7 @@
           <a:p>
             <a:fld id="{78C97017-6FC3-485B-9764-EAC9E56C1D49}" type="datetimeFigureOut">
               <a:rPr lang="en-US" smtClean="0"/>
-              <a:t>12/15/2018</a:t>
+              <a:t>3/31/2019</a:t>
             </a:fld>
             <a:endParaRPr lang="en-US"/>
           </a:p>
@@ -3067,7 +3067,7 @@
           <a:p>
             <a:fld id="{78C97017-6FC3-485B-9764-EAC9E56C1D49}" type="datetimeFigureOut">
               <a:rPr lang="en-US" smtClean="0"/>
-              <a:t>12/15/2018</a:t>
+              <a:t>3/31/2019</a:t>
             </a:fld>
             <a:endParaRPr lang="en-US"/>
           </a:p>
@@ -3563,8 +3563,8 @@
         </p:nvSpPr>
         <p:spPr>
           <a:xfrm>
-            <a:off x="3412069" y="2191178"/>
-            <a:ext cx="1295400" cy="552022"/>
+            <a:off x="3411554" y="2987023"/>
+            <a:ext cx="1295400" cy="444639"/>
           </a:xfrm>
           <a:prstGeom prst="roundRect">
             <a:avLst/>
@@ -3685,8 +3685,8 @@
         </p:nvSpPr>
         <p:spPr>
           <a:xfrm>
-            <a:off x="3412069" y="3124200"/>
-            <a:ext cx="1295400" cy="723791"/>
+            <a:off x="3409495" y="2199100"/>
+            <a:ext cx="1295400" cy="526905"/>
           </a:xfrm>
           <a:prstGeom prst="roundRect">
             <a:avLst/>
@@ -3803,14 +3803,15 @@
         <p:nvCxnSpPr>
           <p:cNvPr id="10" name="Straight Arrow Connector 9"/>
           <p:cNvCxnSpPr>
+            <a:cxnSpLocks/>
             <a:endCxn id="3" idx="1"/>
           </p:cNvCxnSpPr>
           <p:nvPr/>
         </p:nvCxnSpPr>
         <p:spPr>
-          <a:xfrm>
-            <a:off x="2573871" y="2467189"/>
-            <a:ext cx="838198" cy="0"/>
+          <a:xfrm flipV="1">
+            <a:off x="2568895" y="3209343"/>
+            <a:ext cx="842659" cy="4113"/>
           </a:xfrm>
           <a:prstGeom prst="straightConnector1">
             <a:avLst/>
@@ -3845,7 +3846,7 @@
         </p:nvCxnSpPr>
         <p:spPr>
           <a:xfrm>
-            <a:off x="2569639" y="3276600"/>
+            <a:off x="2568895" y="2481605"/>
             <a:ext cx="838198" cy="0"/>
           </a:xfrm>
           <a:prstGeom prst="straightConnector1">
@@ -3877,15 +3878,16 @@
         <p:nvCxnSpPr>
           <p:cNvPr id="13" name="Straight Arrow Connector 12"/>
           <p:cNvCxnSpPr>
-            <a:stCxn id="3" idx="2"/>
-            <a:endCxn id="5" idx="0"/>
+            <a:cxnSpLocks/>
+            <a:stCxn id="3" idx="0"/>
+            <a:endCxn id="5" idx="2"/>
           </p:cNvCxnSpPr>
           <p:nvPr/>
         </p:nvCxnSpPr>
         <p:spPr>
-          <a:xfrm>
-            <a:off x="4059769" y="2743200"/>
-            <a:ext cx="0" cy="381000"/>
+          <a:xfrm flipH="1" flipV="1">
+            <a:off x="4057195" y="2726005"/>
+            <a:ext cx="2059" cy="261018"/>
           </a:xfrm>
           <a:prstGeom prst="straightConnector1">
             <a:avLst/>
@@ -3928,7 +3930,7 @@
           </a:prstGeom>
           <a:ln w="28575">
             <a:solidFill>
-              <a:srgbClr val="0070C0"/>
+              <a:srgbClr val="7030A0"/>
             </a:solidFill>
             <a:tailEnd type="arrow"/>
           </a:ln>
@@ -4036,13 +4038,16 @@
       <p:cxnSp>
         <p:nvCxnSpPr>
           <p:cNvPr id="34" name="Straight Arrow Connector 33"/>
-          <p:cNvCxnSpPr/>
+          <p:cNvCxnSpPr>
+            <a:cxnSpLocks/>
+            <a:stCxn id="4" idx="3"/>
+          </p:cNvCxnSpPr>
           <p:nvPr/>
         </p:nvCxnSpPr>
         <p:spPr>
-          <a:xfrm flipV="1">
-            <a:off x="6680199" y="2467190"/>
-            <a:ext cx="939801" cy="1"/>
+          <a:xfrm>
+            <a:off x="6612469" y="2467190"/>
+            <a:ext cx="1007531" cy="1"/>
           </a:xfrm>
           <a:prstGeom prst="straightConnector1">
             <a:avLst/>

</xml_diff>